<commit_message>
Built input interface starter.
</commit_message>
<xml_diff>
--- a/Range Tool Outline.pptx
+++ b/Range Tool Outline.pptx
@@ -5,13 +5,14 @@
     <p:sldMasterId id="2147483661" r:id="rId1"/>
   </p:sldMasterIdLst>
   <p:notesMasterIdLst>
-    <p:notesMasterId r:id="rId6"/>
+    <p:notesMasterId r:id="rId7"/>
   </p:notesMasterIdLst>
   <p:sldIdLst>
     <p:sldId id="258" r:id="rId2"/>
     <p:sldId id="262" r:id="rId3"/>
     <p:sldId id="263" r:id="rId4"/>
     <p:sldId id="264" r:id="rId5"/>
+    <p:sldId id="265" r:id="rId6"/>
   </p:sldIdLst>
   <p:sldSz cx="12192000" cy="6858000"/>
   <p:notesSz cx="6858000" cy="9144000"/>
@@ -200,7 +201,7 @@
           <a:p>
             <a:fld id="{9BB5AC68-C60C-4B56-9300-D12C35CC6036}" type="datetimeFigureOut">
               <a:rPr lang="en-GB" smtClean="0"/>
-              <a:t>15/02/2018</a:t>
+              <a:t>21/02/2018</a:t>
             </a:fld>
             <a:endParaRPr lang="en-GB"/>
           </a:p>
@@ -617,7 +618,7 @@
           <a:p>
             <a:fld id="{1346DE9F-6E5B-4424-8B39-E20A90614DE6}" type="datetime1">
               <a:rPr lang="en-GB" smtClean="0"/>
-              <a:t>15/02/2018</a:t>
+              <a:t>21/02/2018</a:t>
             </a:fld>
             <a:endParaRPr lang="en-GB"/>
           </a:p>
@@ -821,7 +822,7 @@
           <a:p>
             <a:fld id="{CB1558C8-32C4-4433-89E4-431C087F4F0E}" type="datetime1">
               <a:rPr lang="en-GB" smtClean="0"/>
-              <a:t>15/02/2018</a:t>
+              <a:t>21/02/2018</a:t>
             </a:fld>
             <a:endParaRPr lang="en-GB"/>
           </a:p>
@@ -1034,7 +1035,7 @@
           <a:p>
             <a:fld id="{A68BD927-2F64-47CD-903A-D266AAFA5994}" type="datetime1">
               <a:rPr lang="en-GB" smtClean="0"/>
-              <a:t>15/02/2018</a:t>
+              <a:t>21/02/2018</a:t>
             </a:fld>
             <a:endParaRPr lang="en-GB"/>
           </a:p>
@@ -1338,7 +1339,7 @@
           <a:p>
             <a:fld id="{495BA469-9AFE-4DD6-90C2-DFED87A066E7}" type="datetime1">
               <a:rPr lang="en-GB" smtClean="0"/>
-              <a:t>15/02/2018</a:t>
+              <a:t>21/02/2018</a:t>
             </a:fld>
             <a:endParaRPr lang="en-GB"/>
           </a:p>
@@ -1617,7 +1618,7 @@
           <a:p>
             <a:fld id="{3A243403-DE58-4B3A-8145-970732943940}" type="datetime1">
               <a:rPr lang="en-GB" smtClean="0"/>
-              <a:t>15/02/2018</a:t>
+              <a:t>21/02/2018</a:t>
             </a:fld>
             <a:endParaRPr lang="en-GB"/>
           </a:p>
@@ -1888,7 +1889,7 @@
           <a:p>
             <a:fld id="{8AA741DB-92C9-477A-AB5C-42CDDA5C8C2C}" type="datetime1">
               <a:rPr lang="en-GB" smtClean="0"/>
-              <a:t>15/02/2018</a:t>
+              <a:t>21/02/2018</a:t>
             </a:fld>
             <a:endParaRPr lang="en-GB"/>
           </a:p>
@@ -2306,7 +2307,7 @@
           <a:p>
             <a:fld id="{A2866987-CC0F-4718-9488-409123EA7E25}" type="datetime1">
               <a:rPr lang="en-GB" smtClean="0"/>
-              <a:t>15/02/2018</a:t>
+              <a:t>21/02/2018</a:t>
             </a:fld>
             <a:endParaRPr lang="en-GB"/>
           </a:p>
@@ -2451,7 +2452,7 @@
           <a:p>
             <a:fld id="{F5CD0E36-B6E6-4EEC-87E7-452BA56AB5BA}" type="datetime1">
               <a:rPr lang="en-GB" smtClean="0"/>
-              <a:t>15/02/2018</a:t>
+              <a:t>21/02/2018</a:t>
             </a:fld>
             <a:endParaRPr lang="en-GB"/>
           </a:p>
@@ -2567,7 +2568,7 @@
           <a:p>
             <a:fld id="{F2D2B03A-ACC7-425B-BA73-54C93C3B54E1}" type="datetime1">
               <a:rPr lang="en-GB" smtClean="0"/>
-              <a:t>15/02/2018</a:t>
+              <a:t>21/02/2018</a:t>
             </a:fld>
             <a:endParaRPr lang="en-GB"/>
           </a:p>
@@ -2883,7 +2884,7 @@
           <a:p>
             <a:fld id="{917E4FEE-BF4C-4777-AB62-F99321E93F1C}" type="datetime1">
               <a:rPr lang="en-GB" smtClean="0"/>
-              <a:t>15/02/2018</a:t>
+              <a:t>21/02/2018</a:t>
             </a:fld>
             <a:endParaRPr lang="en-GB"/>
           </a:p>
@@ -3175,7 +3176,7 @@
           <a:p>
             <a:fld id="{EB511D16-444D-4FFC-B076-53148DC691BE}" type="datetime1">
               <a:rPr lang="en-GB" smtClean="0"/>
-              <a:t>15/02/2018</a:t>
+              <a:t>21/02/2018</a:t>
             </a:fld>
             <a:endParaRPr lang="en-GB"/>
           </a:p>
@@ -3421,7 +3422,7 @@
           <a:p>
             <a:fld id="{D461B08A-F91D-4590-A284-BBFDBD24601B}" type="datetime1">
               <a:rPr lang="en-GB" smtClean="0"/>
-              <a:t>15/02/2018</a:t>
+              <a:t>21/02/2018</a:t>
             </a:fld>
             <a:endParaRPr lang="en-GB"/>
           </a:p>
@@ -4182,7 +4183,7 @@
           <a:p>
             <a:fld id="{0416D09A-AFC2-4D97-9208-9D74DDEF845F}" type="datetime1">
               <a:rPr lang="en-GB" smtClean="0"/>
-              <a:t>15/02/2018</a:t>
+              <a:t>21/02/2018</a:t>
             </a:fld>
             <a:endParaRPr lang="en-GB"/>
           </a:p>
@@ -4489,7 +4490,7 @@
           <a:p>
             <a:fld id="{0416D09A-AFC2-4D97-9208-9D74DDEF845F}" type="datetime1">
               <a:rPr lang="en-GB" smtClean="0"/>
-              <a:t>15/02/2018</a:t>
+              <a:t>21/02/2018</a:t>
             </a:fld>
             <a:endParaRPr lang="en-GB"/>
           </a:p>
@@ -4841,7 +4842,7 @@
           <a:p>
             <a:fld id="{0416D09A-AFC2-4D97-9208-9D74DDEF845F}" type="datetime1">
               <a:rPr lang="en-GB" smtClean="0"/>
-              <a:t>15/02/2018</a:t>
+              <a:t>21/02/2018</a:t>
             </a:fld>
             <a:endParaRPr lang="en-GB"/>
           </a:p>
@@ -5224,6 +5225,153 @@
     <p:extLst>
       <p:ext uri="{BB962C8B-B14F-4D97-AF65-F5344CB8AC3E}">
         <p14:creationId xmlns:p14="http://schemas.microsoft.com/office/powerpoint/2010/main" val="1684303188"/>
+      </p:ext>
+    </p:extLst>
+  </p:cSld>
+  <p:clrMapOvr>
+    <a:masterClrMapping/>
+  </p:clrMapOvr>
+</p:sld>
+</file>
+
+<file path=ppt/slides/slide5.xml><?xml version="1.0" encoding="utf-8"?>
+<p:sld xmlns:a="http://schemas.openxmlformats.org/drawingml/2006/main" xmlns:r="http://schemas.openxmlformats.org/officeDocument/2006/relationships" xmlns:p="http://schemas.openxmlformats.org/presentationml/2006/main">
+  <p:cSld>
+    <p:spTree>
+      <p:nvGrpSpPr>
+        <p:cNvPr id="1" name=""/>
+        <p:cNvGrpSpPr/>
+        <p:nvPr/>
+      </p:nvGrpSpPr>
+      <p:grpSpPr>
+        <a:xfrm>
+          <a:off x="0" y="0"/>
+          <a:ext cx="0" cy="0"/>
+          <a:chOff x="0" y="0"/>
+          <a:chExt cx="0" cy="0"/>
+        </a:xfrm>
+      </p:grpSpPr>
+      <p:sp>
+        <p:nvSpPr>
+          <p:cNvPr id="2" name="Date Placeholder 1">
+            <a:extLst>
+              <a:ext uri="{FF2B5EF4-FFF2-40B4-BE49-F238E27FC236}">
+                <a16:creationId xmlns:a16="http://schemas.microsoft.com/office/drawing/2014/main" id="{2F034032-990C-45F9-A65E-CE969856E74C}"/>
+              </a:ext>
+            </a:extLst>
+          </p:cNvPr>
+          <p:cNvSpPr>
+            <a:spLocks noGrp="1"/>
+          </p:cNvSpPr>
+          <p:nvPr>
+            <p:ph type="dt" sz="half" idx="10"/>
+          </p:nvPr>
+        </p:nvSpPr>
+        <p:spPr/>
+        <p:txBody>
+          <a:bodyPr/>
+          <a:lstStyle/>
+          <a:p>
+            <a:fld id="{0416D09A-AFC2-4D97-9208-9D74DDEF845F}" type="datetime1">
+              <a:rPr lang="en-GB" smtClean="0"/>
+              <a:t>21/02/2018</a:t>
+            </a:fld>
+            <a:endParaRPr lang="en-GB"/>
+          </a:p>
+        </p:txBody>
+      </p:sp>
+      <p:sp>
+        <p:nvSpPr>
+          <p:cNvPr id="5" name="Footer Placeholder 4">
+            <a:extLst>
+              <a:ext uri="{FF2B5EF4-FFF2-40B4-BE49-F238E27FC236}">
+                <a16:creationId xmlns:a16="http://schemas.microsoft.com/office/drawing/2014/main" id="{58198C7D-8EFF-4245-A605-DBFF5F33AF00}"/>
+              </a:ext>
+            </a:extLst>
+          </p:cNvPr>
+          <p:cNvSpPr>
+            <a:spLocks noGrp="1"/>
+          </p:cNvSpPr>
+          <p:nvPr>
+            <p:ph type="ftr" sz="quarter" idx="11"/>
+          </p:nvPr>
+        </p:nvSpPr>
+        <p:spPr/>
+        <p:txBody>
+          <a:bodyPr/>
+          <a:lstStyle/>
+          <a:p>
+            <a:r>
+              <a:rPr lang="en-GB"/>
+              <a:t>ARRIVAL LTD.  -   CONFIDENTIAL</a:t>
+            </a:r>
+            <a:endParaRPr lang="en-GB" dirty="0"/>
+          </a:p>
+        </p:txBody>
+      </p:sp>
+      <p:sp>
+        <p:nvSpPr>
+          <p:cNvPr id="6" name="Slide Number Placeholder 5">
+            <a:extLst>
+              <a:ext uri="{FF2B5EF4-FFF2-40B4-BE49-F238E27FC236}">
+                <a16:creationId xmlns:a16="http://schemas.microsoft.com/office/drawing/2014/main" id="{8410225E-98A7-44F1-BCBD-83212AEBA057}"/>
+              </a:ext>
+            </a:extLst>
+          </p:cNvPr>
+          <p:cNvSpPr>
+            <a:spLocks noGrp="1"/>
+          </p:cNvSpPr>
+          <p:nvPr>
+            <p:ph type="sldNum" sz="quarter" idx="12"/>
+          </p:nvPr>
+        </p:nvSpPr>
+        <p:spPr/>
+        <p:txBody>
+          <a:bodyPr/>
+          <a:lstStyle/>
+          <a:p>
+            <a:fld id="{89F19424-4939-4277-BED7-29009FEAF8B5}" type="slidenum">
+              <a:rPr lang="en-GB" smtClean="0"/>
+              <a:t>5</a:t>
+            </a:fld>
+            <a:endParaRPr lang="en-GB"/>
+          </a:p>
+        </p:txBody>
+      </p:sp>
+      <p:pic>
+        <p:nvPicPr>
+          <p:cNvPr id="12" name="Picture 11">
+            <a:extLst>
+              <a:ext uri="{FF2B5EF4-FFF2-40B4-BE49-F238E27FC236}">
+                <a16:creationId xmlns:a16="http://schemas.microsoft.com/office/drawing/2014/main" id="{6EE160DF-08B7-4A83-95B8-ECC2E3914301}"/>
+              </a:ext>
+            </a:extLst>
+          </p:cNvPr>
+          <p:cNvPicPr>
+            <a:picLocks noChangeAspect="1"/>
+          </p:cNvPicPr>
+          <p:nvPr/>
+        </p:nvPicPr>
+        <p:blipFill>
+          <a:blip r:embed="rId2"/>
+          <a:stretch>
+            <a:fillRect/>
+          </a:stretch>
+        </p:blipFill>
+        <p:spPr>
+          <a:xfrm>
+            <a:off x="637309" y="1093117"/>
+            <a:ext cx="8496331" cy="4143902"/>
+          </a:xfrm>
+          <a:prstGeom prst="rect">
+            <a:avLst/>
+          </a:prstGeom>
+        </p:spPr>
+      </p:pic>
+    </p:spTree>
+    <p:extLst>
+      <p:ext uri="{BB962C8B-B14F-4D97-AF65-F5344CB8AC3E}">
+        <p14:creationId xmlns:p14="http://schemas.microsoft.com/office/powerpoint/2010/main" val="1205362502"/>
       </p:ext>
     </p:extLst>
   </p:cSld>

</xml_diff>